<commit_message>
Added Necessary User Story
Location history requiring DB
</commit_message>
<xml_diff>
--- a/Technology Presentation.pptx
+++ b/Technology Presentation.pptx
@@ -63,6 +63,10 @@
     <p:sldId id="311" r:id="rId57"/>
     <p:sldId id="312" r:id="rId58"/>
     <p:sldId id="313" r:id="rId59"/>
+    <p:sldId id="314" r:id="rId60"/>
+    <p:sldId id="315" r:id="rId61"/>
+    <p:sldId id="316" r:id="rId62"/>
+    <p:sldId id="317" r:id="rId63"/>
   </p:sldIdLst>
   <p:sldSz cx="12192000" cy="6858000"/>
   <p:notesSz cx="6858000" cy="9144000"/>
@@ -366,7 +370,7 @@
           <a:p>
             <a:fld id="{4FACE682-7757-4F60-9924-7C54F945BCEE}" type="datetimeFigureOut">
               <a:rPr lang="en-US" smtClean="0"/>
-              <a:t>5/11/2018</a:t>
+              <a:t>11/5/2018</a:t>
             </a:fld>
             <a:endParaRPr lang="en-US"/>
           </a:p>
@@ -641,7 +645,7 @@
           <a:p>
             <a:fld id="{4FACE682-7757-4F60-9924-7C54F945BCEE}" type="datetimeFigureOut">
               <a:rPr lang="en-US" smtClean="0"/>
-              <a:t>5/11/2018</a:t>
+              <a:t>11/5/2018</a:t>
             </a:fld>
             <a:endParaRPr lang="en-US"/>
           </a:p>
@@ -835,7 +839,7 @@
           <a:p>
             <a:fld id="{4FACE682-7757-4F60-9924-7C54F945BCEE}" type="datetimeFigureOut">
               <a:rPr lang="en-US" smtClean="0"/>
-              <a:t>5/11/2018</a:t>
+              <a:t>11/5/2018</a:t>
             </a:fld>
             <a:endParaRPr lang="en-US"/>
           </a:p>
@@ -1108,7 +1112,7 @@
           <a:p>
             <a:fld id="{4FACE682-7757-4F60-9924-7C54F945BCEE}" type="datetimeFigureOut">
               <a:rPr lang="en-US" smtClean="0"/>
-              <a:t>5/11/2018</a:t>
+              <a:t>11/5/2018</a:t>
             </a:fld>
             <a:endParaRPr lang="en-US"/>
           </a:p>
@@ -1449,7 +1453,7 @@
           <a:p>
             <a:fld id="{4FACE682-7757-4F60-9924-7C54F945BCEE}" type="datetimeFigureOut">
               <a:rPr lang="en-US" smtClean="0"/>
-              <a:t>5/11/2018</a:t>
+              <a:t>11/5/2018</a:t>
             </a:fld>
             <a:endParaRPr lang="en-US"/>
           </a:p>
@@ -2072,7 +2076,7 @@
           <a:p>
             <a:fld id="{4FACE682-7757-4F60-9924-7C54F945BCEE}" type="datetimeFigureOut">
               <a:rPr lang="en-US" smtClean="0"/>
-              <a:t>5/11/2018</a:t>
+              <a:t>11/5/2018</a:t>
             </a:fld>
             <a:endParaRPr lang="en-US"/>
           </a:p>
@@ -2932,7 +2936,7 @@
           <a:p>
             <a:fld id="{4FACE682-7757-4F60-9924-7C54F945BCEE}" type="datetimeFigureOut">
               <a:rPr lang="en-US" smtClean="0"/>
-              <a:t>5/11/2018</a:t>
+              <a:t>11/5/2018</a:t>
             </a:fld>
             <a:endParaRPr lang="en-US"/>
           </a:p>
@@ -3102,7 +3106,7 @@
           <a:p>
             <a:fld id="{4FACE682-7757-4F60-9924-7C54F945BCEE}" type="datetimeFigureOut">
               <a:rPr lang="en-US" smtClean="0"/>
-              <a:t>5/11/2018</a:t>
+              <a:t>11/5/2018</a:t>
             </a:fld>
             <a:endParaRPr lang="en-US"/>
           </a:p>
@@ -3282,7 +3286,7 @@
           <a:p>
             <a:fld id="{4FACE682-7757-4F60-9924-7C54F945BCEE}" type="datetimeFigureOut">
               <a:rPr lang="en-US" smtClean="0"/>
-              <a:t>5/11/2018</a:t>
+              <a:t>11/5/2018</a:t>
             </a:fld>
             <a:endParaRPr lang="en-US"/>
           </a:p>
@@ -3452,7 +3456,7 @@
           <a:p>
             <a:fld id="{4FACE682-7757-4F60-9924-7C54F945BCEE}" type="datetimeFigureOut">
               <a:rPr lang="en-US" smtClean="0"/>
-              <a:t>5/11/2018</a:t>
+              <a:t>11/5/2018</a:t>
             </a:fld>
             <a:endParaRPr lang="en-US"/>
           </a:p>
@@ -3699,7 +3703,7 @@
           <a:p>
             <a:fld id="{4FACE682-7757-4F60-9924-7C54F945BCEE}" type="datetimeFigureOut">
               <a:rPr lang="en-US" smtClean="0"/>
-              <a:t>5/11/2018</a:t>
+              <a:t>11/5/2018</a:t>
             </a:fld>
             <a:endParaRPr lang="en-US"/>
           </a:p>
@@ -3991,7 +3995,7 @@
           <a:p>
             <a:fld id="{4FACE682-7757-4F60-9924-7C54F945BCEE}" type="datetimeFigureOut">
               <a:rPr lang="en-US" smtClean="0"/>
-              <a:t>5/11/2018</a:t>
+              <a:t>11/5/2018</a:t>
             </a:fld>
             <a:endParaRPr lang="en-US"/>
           </a:p>
@@ -4435,7 +4439,7 @@
           <a:p>
             <a:fld id="{4FACE682-7757-4F60-9924-7C54F945BCEE}" type="datetimeFigureOut">
               <a:rPr lang="en-US" smtClean="0"/>
-              <a:t>5/11/2018</a:t>
+              <a:t>11/5/2018</a:t>
             </a:fld>
             <a:endParaRPr lang="en-US"/>
           </a:p>
@@ -4553,7 +4557,7 @@
           <a:p>
             <a:fld id="{4FACE682-7757-4F60-9924-7C54F945BCEE}" type="datetimeFigureOut">
               <a:rPr lang="en-US" smtClean="0"/>
-              <a:t>5/11/2018</a:t>
+              <a:t>11/5/2018</a:t>
             </a:fld>
             <a:endParaRPr lang="en-US"/>
           </a:p>
@@ -4648,7 +4652,7 @@
           <a:p>
             <a:fld id="{4FACE682-7757-4F60-9924-7C54F945BCEE}" type="datetimeFigureOut">
               <a:rPr lang="en-US" smtClean="0"/>
-              <a:t>5/11/2018</a:t>
+              <a:t>11/5/2018</a:t>
             </a:fld>
             <a:endParaRPr lang="en-US"/>
           </a:p>
@@ -4927,7 +4931,7 @@
           <a:p>
             <a:fld id="{4FACE682-7757-4F60-9924-7C54F945BCEE}" type="datetimeFigureOut">
               <a:rPr lang="en-US" smtClean="0"/>
-              <a:t>5/11/2018</a:t>
+              <a:t>11/5/2018</a:t>
             </a:fld>
             <a:endParaRPr lang="en-US"/>
           </a:p>
@@ -5202,7 +5206,7 @@
           <a:p>
             <a:fld id="{4FACE682-7757-4F60-9924-7C54F945BCEE}" type="datetimeFigureOut">
               <a:rPr lang="en-US" smtClean="0"/>
-              <a:t>5/11/2018</a:t>
+              <a:t>11/5/2018</a:t>
             </a:fld>
             <a:endParaRPr lang="en-US"/>
           </a:p>
@@ -5631,7 +5635,7 @@
           <a:p>
             <a:fld id="{4FACE682-7757-4F60-9924-7C54F945BCEE}" type="datetimeFigureOut">
               <a:rPr lang="en-US" smtClean="0"/>
-              <a:t>5/11/2018</a:t>
+              <a:t>11/5/2018</a:t>
             </a:fld>
             <a:endParaRPr lang="en-US"/>
           </a:p>
@@ -11325,6 +11329,95 @@
 </p:sld>
 </file>
 
+<file path=ppt/slides/slide59.xml><?xml version="1.0" encoding="utf-8"?>
+<p:sld xmlns:a="http://schemas.openxmlformats.org/drawingml/2006/main" xmlns:r="http://schemas.openxmlformats.org/officeDocument/2006/relationships" xmlns:p="http://schemas.openxmlformats.org/presentationml/2006/main">
+  <p:cSld>
+    <p:spTree>
+      <p:nvGrpSpPr>
+        <p:cNvPr id="1" name=""/>
+        <p:cNvGrpSpPr/>
+        <p:nvPr/>
+      </p:nvGrpSpPr>
+      <p:grpSpPr>
+        <a:xfrm>
+          <a:off x="0" y="0"/>
+          <a:ext cx="0" cy="0"/>
+          <a:chOff x="0" y="0"/>
+          <a:chExt cx="0" cy="0"/>
+        </a:xfrm>
+      </p:grpSpPr>
+      <p:sp>
+        <p:nvSpPr>
+          <p:cNvPr id="2" name="Title 1">
+            <a:extLst>
+              <a:ext uri="{FF2B5EF4-FFF2-40B4-BE49-F238E27FC236}">
+                <a16:creationId xmlns:a16="http://schemas.microsoft.com/office/drawing/2014/main" id="{ABFE9964-2DD0-4B8C-9324-5C9218DC5DF7}"/>
+              </a:ext>
+            </a:extLst>
+          </p:cNvPr>
+          <p:cNvSpPr>
+            <a:spLocks noGrp="1"/>
+          </p:cNvSpPr>
+          <p:nvPr>
+            <p:ph type="title"/>
+          </p:nvPr>
+        </p:nvSpPr>
+        <p:spPr>
+          <a:xfrm>
+            <a:off x="674246" y="452718"/>
+            <a:ext cx="9404723" cy="1400530"/>
+          </a:xfrm>
+        </p:spPr>
+        <p:txBody>
+          <a:bodyPr/>
+          <a:lstStyle/>
+          <a:p>
+            <a:r>
+              <a:rPr lang="en-US" dirty="0"/>
+              <a:t>As Kara the dedicated user, I want to save my landmarks online so I can access them from another device.</a:t>
+            </a:r>
+            <a:endParaRPr lang="en-US" sz="4800" dirty="0"/>
+          </a:p>
+        </p:txBody>
+      </p:sp>
+      <p:sp>
+        <p:nvSpPr>
+          <p:cNvPr id="3" name="Content Placeholder 2">
+            <a:extLst>
+              <a:ext uri="{FF2B5EF4-FFF2-40B4-BE49-F238E27FC236}">
+                <a16:creationId xmlns:a16="http://schemas.microsoft.com/office/drawing/2014/main" id="{361D3B48-B632-4E60-8736-F1558045DB59}"/>
+              </a:ext>
+            </a:extLst>
+          </p:cNvPr>
+          <p:cNvSpPr>
+            <a:spLocks noGrp="1"/>
+          </p:cNvSpPr>
+          <p:nvPr>
+            <p:ph idx="1"/>
+          </p:nvPr>
+        </p:nvSpPr>
+        <p:spPr/>
+        <p:txBody>
+          <a:bodyPr/>
+          <a:lstStyle/>
+          <a:p>
+            <a:endParaRPr lang="en-US" dirty="0"/>
+          </a:p>
+        </p:txBody>
+      </p:sp>
+    </p:spTree>
+    <p:extLst>
+      <p:ext uri="{BB962C8B-B14F-4D97-AF65-F5344CB8AC3E}">
+        <p14:creationId xmlns:p14="http://schemas.microsoft.com/office/powerpoint/2010/main" val="4265448321"/>
+      </p:ext>
+    </p:extLst>
+  </p:cSld>
+  <p:clrMapOvr>
+    <a:masterClrMapping/>
+  </p:clrMapOvr>
+</p:sld>
+</file>
+
 <file path=ppt/slides/slide6.xml><?xml version="1.0" encoding="utf-8"?>
 <p:sld xmlns:a="http://schemas.openxmlformats.org/drawingml/2006/main" xmlns:r="http://schemas.openxmlformats.org/officeDocument/2006/relationships" xmlns:p="http://schemas.openxmlformats.org/presentationml/2006/main">
   <p:cSld>
@@ -11408,6 +11501,306 @@
     <p:extLst>
       <p:ext uri="{BB962C8B-B14F-4D97-AF65-F5344CB8AC3E}">
         <p14:creationId xmlns:p14="http://schemas.microsoft.com/office/powerpoint/2010/main" val="1370581020"/>
+      </p:ext>
+    </p:extLst>
+  </p:cSld>
+  <p:clrMapOvr>
+    <a:masterClrMapping/>
+  </p:clrMapOvr>
+</p:sld>
+</file>
+
+<file path=ppt/slides/slide60.xml><?xml version="1.0" encoding="utf-8"?>
+<p:sld xmlns:a="http://schemas.openxmlformats.org/drawingml/2006/main" xmlns:r="http://schemas.openxmlformats.org/officeDocument/2006/relationships" xmlns:p="http://schemas.openxmlformats.org/presentationml/2006/main">
+  <p:cSld>
+    <p:spTree>
+      <p:nvGrpSpPr>
+        <p:cNvPr id="1" name=""/>
+        <p:cNvGrpSpPr/>
+        <p:nvPr/>
+      </p:nvGrpSpPr>
+      <p:grpSpPr>
+        <a:xfrm>
+          <a:off x="0" y="0"/>
+          <a:ext cx="0" cy="0"/>
+          <a:chOff x="0" y="0"/>
+          <a:chExt cx="0" cy="0"/>
+        </a:xfrm>
+      </p:grpSpPr>
+      <p:sp>
+        <p:nvSpPr>
+          <p:cNvPr id="2" name="Title 1">
+            <a:extLst>
+              <a:ext uri="{FF2B5EF4-FFF2-40B4-BE49-F238E27FC236}">
+                <a16:creationId xmlns:a16="http://schemas.microsoft.com/office/drawing/2014/main" id="{E66C612F-2F3A-4260-BDBF-80671B0DF2ED}"/>
+              </a:ext>
+            </a:extLst>
+          </p:cNvPr>
+          <p:cNvSpPr>
+            <a:spLocks noGrp="1"/>
+          </p:cNvSpPr>
+          <p:nvPr>
+            <p:ph type="title"/>
+          </p:nvPr>
+        </p:nvSpPr>
+        <p:spPr/>
+        <p:txBody>
+          <a:bodyPr/>
+          <a:lstStyle/>
+          <a:p>
+            <a:r>
+              <a:rPr lang="en-US" dirty="0"/>
+              <a:t>[User Accounts]</a:t>
+            </a:r>
+          </a:p>
+        </p:txBody>
+      </p:sp>
+      <p:sp>
+        <p:nvSpPr>
+          <p:cNvPr id="3" name="Content Placeholder 2">
+            <a:extLst>
+              <a:ext uri="{FF2B5EF4-FFF2-40B4-BE49-F238E27FC236}">
+                <a16:creationId xmlns:a16="http://schemas.microsoft.com/office/drawing/2014/main" id="{6C61B333-EC15-417A-92E3-D6641D0F3741}"/>
+              </a:ext>
+            </a:extLst>
+          </p:cNvPr>
+          <p:cNvSpPr>
+            <a:spLocks noGrp="1"/>
+          </p:cNvSpPr>
+          <p:nvPr>
+            <p:ph idx="1"/>
+          </p:nvPr>
+        </p:nvSpPr>
+        <p:spPr/>
+        <p:txBody>
+          <a:bodyPr/>
+          <a:lstStyle/>
+          <a:p>
+            <a:endParaRPr lang="en-US"/>
+          </a:p>
+        </p:txBody>
+      </p:sp>
+    </p:spTree>
+    <p:extLst>
+      <p:ext uri="{BB962C8B-B14F-4D97-AF65-F5344CB8AC3E}">
+        <p14:creationId xmlns:p14="http://schemas.microsoft.com/office/powerpoint/2010/main" val="1435937211"/>
+      </p:ext>
+    </p:extLst>
+  </p:cSld>
+  <p:clrMapOvr>
+    <a:masterClrMapping/>
+  </p:clrMapOvr>
+</p:sld>
+</file>
+
+<file path=ppt/slides/slide61.xml><?xml version="1.0" encoding="utf-8"?>
+<p:sld xmlns:a="http://schemas.openxmlformats.org/drawingml/2006/main" xmlns:r="http://schemas.openxmlformats.org/officeDocument/2006/relationships" xmlns:p="http://schemas.openxmlformats.org/presentationml/2006/main">
+  <p:cSld>
+    <p:spTree>
+      <p:nvGrpSpPr>
+        <p:cNvPr id="1" name=""/>
+        <p:cNvGrpSpPr/>
+        <p:nvPr/>
+      </p:nvGrpSpPr>
+      <p:grpSpPr>
+        <a:xfrm>
+          <a:off x="0" y="0"/>
+          <a:ext cx="0" cy="0"/>
+          <a:chOff x="0" y="0"/>
+          <a:chExt cx="0" cy="0"/>
+        </a:xfrm>
+      </p:grpSpPr>
+      <p:sp>
+        <p:nvSpPr>
+          <p:cNvPr id="2" name="Title 1">
+            <a:extLst>
+              <a:ext uri="{FF2B5EF4-FFF2-40B4-BE49-F238E27FC236}">
+                <a16:creationId xmlns:a16="http://schemas.microsoft.com/office/drawing/2014/main" id="{BA35D0AB-9A37-479C-9406-C70EC5D04068}"/>
+              </a:ext>
+            </a:extLst>
+          </p:cNvPr>
+          <p:cNvSpPr>
+            <a:spLocks noGrp="1"/>
+          </p:cNvSpPr>
+          <p:nvPr>
+            <p:ph type="title"/>
+          </p:nvPr>
+        </p:nvSpPr>
+        <p:spPr/>
+        <p:txBody>
+          <a:bodyPr/>
+          <a:lstStyle/>
+          <a:p>
+            <a:r>
+              <a:rPr lang="en-US" dirty="0"/>
+              <a:t>[Possible Technology]</a:t>
+            </a:r>
+          </a:p>
+        </p:txBody>
+      </p:sp>
+      <p:sp>
+        <p:nvSpPr>
+          <p:cNvPr id="3" name="Content Placeholder 2">
+            <a:extLst>
+              <a:ext uri="{FF2B5EF4-FFF2-40B4-BE49-F238E27FC236}">
+                <a16:creationId xmlns:a16="http://schemas.microsoft.com/office/drawing/2014/main" id="{C53C1AAE-D52E-4865-94E5-9A746F2B6603}"/>
+              </a:ext>
+            </a:extLst>
+          </p:cNvPr>
+          <p:cNvSpPr>
+            <a:spLocks noGrp="1"/>
+          </p:cNvSpPr>
+          <p:nvPr>
+            <p:ph idx="1"/>
+          </p:nvPr>
+        </p:nvSpPr>
+        <p:spPr/>
+        <p:txBody>
+          <a:bodyPr/>
+          <a:lstStyle/>
+          <a:p>
+            <a:pPr marL="0" indent="0">
+              <a:buNone/>
+            </a:pPr>
+            <a:r>
+              <a:rPr lang="en-US" dirty="0"/>
+              <a:t>Pros</a:t>
+            </a:r>
+          </a:p>
+          <a:p>
+            <a:r>
+              <a:rPr lang="en-US" dirty="0"/>
+              <a:t>[Pro]</a:t>
+            </a:r>
+          </a:p>
+          <a:p>
+            <a:r>
+              <a:rPr lang="en-US" dirty="0"/>
+              <a:t>[Pro]</a:t>
+            </a:r>
+          </a:p>
+          <a:p>
+            <a:endParaRPr lang="en-US" dirty="0"/>
+          </a:p>
+          <a:p>
+            <a:pPr marL="0" indent="0">
+              <a:buNone/>
+            </a:pPr>
+            <a:r>
+              <a:rPr lang="en-US" dirty="0"/>
+              <a:t>Cons</a:t>
+            </a:r>
+          </a:p>
+          <a:p>
+            <a:r>
+              <a:rPr lang="en-US" dirty="0"/>
+              <a:t>[Con]</a:t>
+            </a:r>
+          </a:p>
+          <a:p>
+            <a:r>
+              <a:rPr lang="en-US" dirty="0"/>
+              <a:t>[Con]</a:t>
+            </a:r>
+          </a:p>
+        </p:txBody>
+      </p:sp>
+    </p:spTree>
+    <p:extLst>
+      <p:ext uri="{BB962C8B-B14F-4D97-AF65-F5344CB8AC3E}">
+        <p14:creationId xmlns:p14="http://schemas.microsoft.com/office/powerpoint/2010/main" val="732696724"/>
+      </p:ext>
+    </p:extLst>
+  </p:cSld>
+  <p:clrMapOvr>
+    <a:masterClrMapping/>
+  </p:clrMapOvr>
+</p:sld>
+</file>
+
+<file path=ppt/slides/slide62.xml><?xml version="1.0" encoding="utf-8"?>
+<p:sld xmlns:a="http://schemas.openxmlformats.org/drawingml/2006/main" xmlns:r="http://schemas.openxmlformats.org/officeDocument/2006/relationships" xmlns:p="http://schemas.openxmlformats.org/presentationml/2006/main">
+  <p:cSld>
+    <p:spTree>
+      <p:nvGrpSpPr>
+        <p:cNvPr id="1" name=""/>
+        <p:cNvGrpSpPr/>
+        <p:nvPr/>
+      </p:nvGrpSpPr>
+      <p:grpSpPr>
+        <a:xfrm>
+          <a:off x="0" y="0"/>
+          <a:ext cx="0" cy="0"/>
+          <a:chOff x="0" y="0"/>
+          <a:chExt cx="0" cy="0"/>
+        </a:xfrm>
+      </p:grpSpPr>
+      <p:sp>
+        <p:nvSpPr>
+          <p:cNvPr id="2" name="Title 1">
+            <a:extLst>
+              <a:ext uri="{FF2B5EF4-FFF2-40B4-BE49-F238E27FC236}">
+                <a16:creationId xmlns:a16="http://schemas.microsoft.com/office/drawing/2014/main" id="{33182361-C770-430C-97A0-B9298FA3FE50}"/>
+              </a:ext>
+            </a:extLst>
+          </p:cNvPr>
+          <p:cNvSpPr>
+            <a:spLocks noGrp="1"/>
+          </p:cNvSpPr>
+          <p:nvPr>
+            <p:ph type="title"/>
+          </p:nvPr>
+        </p:nvSpPr>
+        <p:spPr/>
+        <p:txBody>
+          <a:bodyPr/>
+          <a:lstStyle/>
+          <a:p>
+            <a:r>
+              <a:rPr lang="en-US" dirty="0"/>
+              <a:t>[Chosen Technology]</a:t>
+            </a:r>
+          </a:p>
+        </p:txBody>
+      </p:sp>
+      <p:sp>
+        <p:nvSpPr>
+          <p:cNvPr id="3" name="Content Placeholder 2">
+            <a:extLst>
+              <a:ext uri="{FF2B5EF4-FFF2-40B4-BE49-F238E27FC236}">
+                <a16:creationId xmlns:a16="http://schemas.microsoft.com/office/drawing/2014/main" id="{6457FBD9-768E-4864-B576-83C1D02FB7F8}"/>
+              </a:ext>
+            </a:extLst>
+          </p:cNvPr>
+          <p:cNvSpPr>
+            <a:spLocks noGrp="1"/>
+          </p:cNvSpPr>
+          <p:nvPr>
+            <p:ph idx="1"/>
+          </p:nvPr>
+        </p:nvSpPr>
+        <p:spPr/>
+        <p:txBody>
+          <a:bodyPr/>
+          <a:lstStyle/>
+          <a:p>
+            <a:r>
+              <a:rPr lang="en-US" dirty="0"/>
+              <a:t>[Reason]</a:t>
+            </a:r>
+          </a:p>
+          <a:p>
+            <a:r>
+              <a:rPr lang="en-US" dirty="0"/>
+              <a:t>[Reason]</a:t>
+            </a:r>
+          </a:p>
+        </p:txBody>
+      </p:sp>
+    </p:spTree>
+    <p:extLst>
+      <p:ext uri="{BB962C8B-B14F-4D97-AF65-F5344CB8AC3E}">
+        <p14:creationId xmlns:p14="http://schemas.microsoft.com/office/powerpoint/2010/main" val="588317044"/>
       </p:ext>
     </p:extLst>
   </p:cSld>

</xml_diff>